<commit_message>
Doc and UML updated.
</commit_message>
<xml_diff>
--- a/doc/src/lionengine.pptx
+++ b/doc/src/lionengine.pptx
@@ -6876,17 +6876,17 @@
     </dgm:pt>
   </dgm:ptLst>
   <dgm:cxnLst>
+    <dgm:cxn modelId="{B3EF336B-9E31-4E8E-AA15-FCFD9A986A32}" srcId="{DC064894-6A42-4AD7-BAF4-D69F41465C73}" destId="{1AFAA640-80AC-4484-9644-A2C0E46C71AE}" srcOrd="1" destOrd="0" parTransId="{260074B3-1A3F-4F92-A7E2-F1B14FF4D570}" sibTransId="{09BE3009-A15C-4CF2-9A5E-DFD68823F325}"/>
+    <dgm:cxn modelId="{ABEF0DE1-96F6-4197-86D1-E91D1056EDD5}" type="presOf" srcId="{0FC4C2C7-D0F5-43E7-B7CD-CC8FFDCC95EC}" destId="{CFA77F99-9B57-4B85-8F36-9E8152D51015}" srcOrd="0" destOrd="0" presId="urn:microsoft.com/office/officeart/2005/8/layout/radial3"/>
+    <dgm:cxn modelId="{044A3ACA-33D0-40AC-9684-528B0F96E251}" type="presOf" srcId="{EB18D41C-BDFD-42DA-88F8-9DD6C17305D2}" destId="{78072E67-AF67-48FA-BDCD-99E29DE7D183}" srcOrd="0" destOrd="0" presId="urn:microsoft.com/office/officeart/2005/8/layout/radial3"/>
+    <dgm:cxn modelId="{486CD393-5E02-4366-9CA5-AEB1C3FB98F4}" srcId="{0FC4C2C7-D0F5-43E7-B7CD-CC8FFDCC95EC}" destId="{DC064894-6A42-4AD7-BAF4-D69F41465C73}" srcOrd="0" destOrd="0" parTransId="{01D6B8F3-0843-4C74-AFFC-D87FB858175C}" sibTransId="{297CB09C-5090-4CB3-95A5-C19E7C9706F3}"/>
+    <dgm:cxn modelId="{845C22AB-F8A6-44BF-84A3-1025EA47A136}" type="presOf" srcId="{DC064894-6A42-4AD7-BAF4-D69F41465C73}" destId="{12AA5828-EA59-467E-A802-FA02470A5FCA}" srcOrd="0" destOrd="0" presId="urn:microsoft.com/office/officeart/2005/8/layout/radial3"/>
     <dgm:cxn modelId="{E9CFA00D-9285-4549-84C0-3BDB9FC97285}" type="presOf" srcId="{8AEF435A-0464-43B2-B91E-906DD266D617}" destId="{795110FA-EAA4-4001-8B50-4541BB71D1EC}" srcOrd="0" destOrd="0" presId="urn:microsoft.com/office/officeart/2005/8/layout/radial3"/>
     <dgm:cxn modelId="{8564C4E5-D039-4239-B201-5DF8EF56B6CA}" srcId="{DC064894-6A42-4AD7-BAF4-D69F41465C73}" destId="{8AEF435A-0464-43B2-B91E-906DD266D617}" srcOrd="3" destOrd="0" parTransId="{67B5FF21-D565-4F5E-ACA6-7046DC020A91}" sibTransId="{24102B90-9141-4B5B-8C0C-3DEA63715B2C}"/>
     <dgm:cxn modelId="{9DF4EA8A-8F9C-4697-BBDC-B3159CFABCEB}" type="presOf" srcId="{374590A3-9640-4FB6-A28A-E2B60068BBE8}" destId="{344A7221-815F-426B-B422-45F204A2BB50}" srcOrd="0" destOrd="0" presId="urn:microsoft.com/office/officeart/2005/8/layout/radial3"/>
+    <dgm:cxn modelId="{76F139AF-EE7D-41B8-A94C-78ECBB5A2868}" type="presOf" srcId="{1AFAA640-80AC-4484-9644-A2C0E46C71AE}" destId="{2A7E91C4-76CB-4721-B3D5-4E10FA695679}" srcOrd="0" destOrd="0" presId="urn:microsoft.com/office/officeart/2005/8/layout/radial3"/>
+    <dgm:cxn modelId="{83B7777A-19EA-45D9-B224-AAA146986DE0}" srcId="{DC064894-6A42-4AD7-BAF4-D69F41465C73}" destId="{374590A3-9640-4FB6-A28A-E2B60068BBE8}" srcOrd="0" destOrd="0" parTransId="{107FE185-174C-418D-97EA-1F302FC2FFA6}" sibTransId="{D1258BD4-5149-4D10-A8FE-D92827B6A55A}"/>
     <dgm:cxn modelId="{BE1D3402-38F9-4669-AE4B-035FADDD196F}" srcId="{DC064894-6A42-4AD7-BAF4-D69F41465C73}" destId="{EB18D41C-BDFD-42DA-88F8-9DD6C17305D2}" srcOrd="2" destOrd="0" parTransId="{81D857C5-3675-40E5-A9D4-87F9E19CE06D}" sibTransId="{05311F57-F18D-4827-BC3F-543227AF0CD8}"/>
-    <dgm:cxn modelId="{76F139AF-EE7D-41B8-A94C-78ECBB5A2868}" type="presOf" srcId="{1AFAA640-80AC-4484-9644-A2C0E46C71AE}" destId="{2A7E91C4-76CB-4721-B3D5-4E10FA695679}" srcOrd="0" destOrd="0" presId="urn:microsoft.com/office/officeart/2005/8/layout/radial3"/>
-    <dgm:cxn modelId="{845C22AB-F8A6-44BF-84A3-1025EA47A136}" type="presOf" srcId="{DC064894-6A42-4AD7-BAF4-D69F41465C73}" destId="{12AA5828-EA59-467E-A802-FA02470A5FCA}" srcOrd="0" destOrd="0" presId="urn:microsoft.com/office/officeart/2005/8/layout/radial3"/>
-    <dgm:cxn modelId="{B3EF336B-9E31-4E8E-AA15-FCFD9A986A32}" srcId="{DC064894-6A42-4AD7-BAF4-D69F41465C73}" destId="{1AFAA640-80AC-4484-9644-A2C0E46C71AE}" srcOrd="1" destOrd="0" parTransId="{260074B3-1A3F-4F92-A7E2-F1B14FF4D570}" sibTransId="{09BE3009-A15C-4CF2-9A5E-DFD68823F325}"/>
-    <dgm:cxn modelId="{486CD393-5E02-4366-9CA5-AEB1C3FB98F4}" srcId="{0FC4C2C7-D0F5-43E7-B7CD-CC8FFDCC95EC}" destId="{DC064894-6A42-4AD7-BAF4-D69F41465C73}" srcOrd="0" destOrd="0" parTransId="{01D6B8F3-0843-4C74-AFFC-D87FB858175C}" sibTransId="{297CB09C-5090-4CB3-95A5-C19E7C9706F3}"/>
-    <dgm:cxn modelId="{ABEF0DE1-96F6-4197-86D1-E91D1056EDD5}" type="presOf" srcId="{0FC4C2C7-D0F5-43E7-B7CD-CC8FFDCC95EC}" destId="{CFA77F99-9B57-4B85-8F36-9E8152D51015}" srcOrd="0" destOrd="0" presId="urn:microsoft.com/office/officeart/2005/8/layout/radial3"/>
-    <dgm:cxn modelId="{044A3ACA-33D0-40AC-9684-528B0F96E251}" type="presOf" srcId="{EB18D41C-BDFD-42DA-88F8-9DD6C17305D2}" destId="{78072E67-AF67-48FA-BDCD-99E29DE7D183}" srcOrd="0" destOrd="0" presId="urn:microsoft.com/office/officeart/2005/8/layout/radial3"/>
-    <dgm:cxn modelId="{83B7777A-19EA-45D9-B224-AAA146986DE0}" srcId="{DC064894-6A42-4AD7-BAF4-D69F41465C73}" destId="{374590A3-9640-4FB6-A28A-E2B60068BBE8}" srcOrd="0" destOrd="0" parTransId="{107FE185-174C-418D-97EA-1F302FC2FFA6}" sibTransId="{D1258BD4-5149-4D10-A8FE-D92827B6A55A}"/>
     <dgm:cxn modelId="{F68499DF-D415-47A3-B658-98B2DB8D8C42}" type="presParOf" srcId="{CFA77F99-9B57-4B85-8F36-9E8152D51015}" destId="{BCA1FA56-786E-4313-AC5C-AB8542BCCA4E}" srcOrd="0" destOrd="0" presId="urn:microsoft.com/office/officeart/2005/8/layout/radial3"/>
     <dgm:cxn modelId="{3DF9537E-6A76-475E-AAF9-78A07F8611EC}" type="presParOf" srcId="{BCA1FA56-786E-4313-AC5C-AB8542BCCA4E}" destId="{12AA5828-EA59-467E-A802-FA02470A5FCA}" srcOrd="0" destOrd="0" presId="urn:microsoft.com/office/officeart/2005/8/layout/radial3"/>
     <dgm:cxn modelId="{774E7407-7CB1-4638-9126-6456511C75A7}" type="presParOf" srcId="{BCA1FA56-786E-4313-AC5C-AB8542BCCA4E}" destId="{344A7221-815F-426B-B422-45F204A2BB50}" srcOrd="1" destOrd="0" presId="urn:microsoft.com/office/officeart/2005/8/layout/radial3"/>
@@ -33094,7 +33094,7 @@
           <a:p>
             <a:fld id="{7011E69A-6C3D-49BF-BD64-39027DFF6D9F}" type="datetimeFigureOut">
               <a:rPr lang="fr-FR" smtClean="0"/>
-              <a:t>05/10/2013</a:t>
+              <a:t>06/10/2013</a:t>
             </a:fld>
             <a:endParaRPr lang="fr-FR"/>
           </a:p>
@@ -33259,7 +33259,7 @@
           <a:p>
             <a:fld id="{450F901E-04C0-46F2-9379-59BF332F2F2D}" type="datetimeFigureOut">
               <a:rPr lang="fr-FR" smtClean="0"/>
-              <a:t>05/10/2013</a:t>
+              <a:t>06/10/2013</a:t>
             </a:fld>
             <a:endParaRPr lang="fr-FR" dirty="0"/>
           </a:p>
@@ -33986,7 +33986,7 @@
           <a:p>
             <a:fld id="{12F20915-7C67-4634-A5D8-123A69D3450C}" type="datetime1">
               <a:rPr lang="fr-FR" smtClean="0"/>
-              <a:t>05/10/2013</a:t>
+              <a:t>06/10/2013</a:t>
             </a:fld>
             <a:endParaRPr lang="en-US" dirty="0"/>
           </a:p>
@@ -34188,7 +34188,7 @@
           <a:p>
             <a:fld id="{2384A8FC-7B55-40A5-B33A-A5A21761988E}" type="datetime1">
               <a:rPr lang="fr-FR" smtClean="0"/>
-              <a:t>05/10/2013</a:t>
+              <a:t>06/10/2013</a:t>
             </a:fld>
             <a:endParaRPr lang="en-US"/>
           </a:p>
@@ -34377,7 +34377,7 @@
           <a:p>
             <a:fld id="{06836D45-C7BB-455F-9C10-B2EC6D70AD43}" type="datetime1">
               <a:rPr lang="fr-FR" smtClean="0"/>
-              <a:t>05/10/2013</a:t>
+              <a:t>06/10/2013</a:t>
             </a:fld>
             <a:endParaRPr lang="en-US"/>
           </a:p>
@@ -34657,7 +34657,7 @@
           <a:p>
             <a:fld id="{94ECD26F-6B54-488F-A41A-8F8D17B8D1E7}" type="datetime1">
               <a:rPr lang="fr-FR" smtClean="0"/>
-              <a:t>05/10/2013</a:t>
+              <a:t>06/10/2013</a:t>
             </a:fld>
             <a:endParaRPr lang="en-US"/>
           </a:p>
@@ -35100,7 +35100,7 @@
           <a:p>
             <a:fld id="{902E46E6-5785-4C01-A4FA-D9138E8D39F1}" type="datetime1">
               <a:rPr lang="fr-FR" smtClean="0"/>
-              <a:t>05/10/2013</a:t>
+              <a:t>06/10/2013</a:t>
             </a:fld>
             <a:endParaRPr lang="en-US"/>
           </a:p>
@@ -35353,7 +35353,7 @@
           <a:p>
             <a:fld id="{E37538CF-0A64-40DC-ACAE-A1A01767E9BB}" type="datetime1">
               <a:rPr lang="fr-FR" smtClean="0"/>
-              <a:t>05/10/2013</a:t>
+              <a:t>06/10/2013</a:t>
             </a:fld>
             <a:endParaRPr lang="en-US"/>
           </a:p>
@@ -35600,7 +35600,7 @@
           <a:p>
             <a:fld id="{E24D2700-FAB9-4EC5-833A-BAABD9C3976F}" type="datetime1">
               <a:rPr lang="fr-FR" smtClean="0"/>
-              <a:t>05/10/2013</a:t>
+              <a:t>06/10/2013</a:t>
             </a:fld>
             <a:endParaRPr lang="en-US"/>
           </a:p>
@@ -35799,7 +35799,7 @@
           <a:p>
             <a:fld id="{DECD032C-F0B6-43CF-9069-0621198CB85E}" type="datetime1">
               <a:rPr lang="fr-FR" smtClean="0"/>
-              <a:t>05/10/2013</a:t>
+              <a:t>06/10/2013</a:t>
             </a:fld>
             <a:endParaRPr lang="en-US"/>
           </a:p>
@@ -35901,7 +35901,7 @@
           <a:p>
             <a:fld id="{B2E7E3DA-57C2-4A4D-B010-BCB245593FE5}" type="datetime1">
               <a:rPr lang="fr-FR" smtClean="0"/>
-              <a:t>05/10/2013</a:t>
+              <a:t>06/10/2013</a:t>
             </a:fld>
             <a:endParaRPr lang="en-US"/>
           </a:p>
@@ -36041,7 +36041,7 @@
           <a:p>
             <a:fld id="{CBB9F109-E754-4CCC-A7B1-F4F6237E38C1}" type="datetime1">
               <a:rPr lang="fr-FR" smtClean="0"/>
-              <a:t>05/10/2013</a:t>
+              <a:t>06/10/2013</a:t>
             </a:fld>
             <a:endParaRPr lang="en-US"/>
           </a:p>
@@ -36563,7 +36563,7 @@
           <a:p>
             <a:fld id="{60D7E2F9-E6A8-4DA9-9914-BA60BD91563C}" type="datetime1">
               <a:rPr lang="fr-FR" smtClean="0"/>
-              <a:t>05/10/2013</a:t>
+              <a:t>06/10/2013</a:t>
             </a:fld>
             <a:endParaRPr lang="en-US"/>
           </a:p>
@@ -36828,7 +36828,7 @@
           <a:p>
             <a:fld id="{1F2438D6-D77E-4059-83C5-4B30AFB8DDBF}" type="datetime1">
               <a:rPr lang="fr-FR" smtClean="0"/>
-              <a:t>05/10/2013</a:t>
+              <a:t>06/10/2013</a:t>
             </a:fld>
             <a:endParaRPr lang="en-US"/>
           </a:p>
@@ -37459,7 +37459,7 @@
             <a:fld id="{F0116066-8E82-4E82-B0B5-60D788EDB8F1}" type="datetime1">
               <a:rPr lang="fr-FR" smtClean="0"/>
               <a:pPr/>
-              <a:t>05/10/2013</a:t>
+              <a:t>06/10/2013</a:t>
             </a:fld>
             <a:endParaRPr lang="en-US" dirty="0"/>
           </a:p>
@@ -37937,7 +37937,7 @@
       </p:sp>
       <p:pic>
         <p:nvPicPr>
-          <p:cNvPr id="7" name="Espace réservé du contenu 6"/>
+          <p:cNvPr id="6" name="Espace réservé du contenu 5"/>
           <p:cNvPicPr>
             <a:picLocks noGrp="1" noChangeAspect="1"/>
           </p:cNvPicPr>
@@ -37959,8 +37959,8 @@
         </p:blipFill>
         <p:spPr>
           <a:xfrm>
-            <a:off x="2051720" y="1556792"/>
-            <a:ext cx="5131218" cy="4726503"/>
+            <a:off x="612775" y="2263571"/>
+            <a:ext cx="8153400" cy="3169057"/>
           </a:xfrm>
         </p:spPr>
       </p:pic>
@@ -38349,10 +38349,6 @@
               </a:rPr>
               <a:t>)</a:t>
             </a:r>
-            <a:endParaRPr lang="fr-FR" sz="2000" dirty="0" smtClean="0">
-              <a:latin typeface="Courier New" pitchFamily="49" charset="0"/>
-              <a:cs typeface="Courier New" pitchFamily="49" charset="0"/>
-            </a:endParaRPr>
           </a:p>
           <a:p>
             <a:pPr lvl="1"/>
@@ -39193,7 +39189,7 @@
       </p:sp>
       <p:pic>
         <p:nvPicPr>
-          <p:cNvPr id="7" name="Espace réservé du contenu 6"/>
+          <p:cNvPr id="6" name="Espace réservé du contenu 5"/>
           <p:cNvPicPr>
             <a:picLocks noGrp="1" noChangeAspect="1"/>
           </p:cNvPicPr>
@@ -39215,8 +39211,8 @@
         </p:blipFill>
         <p:spPr>
           <a:xfrm>
-            <a:off x="1732778" y="1600200"/>
-            <a:ext cx="5913394" cy="4495800"/>
+            <a:off x="1547664" y="1515622"/>
+            <a:ext cx="6120680" cy="4792542"/>
           </a:xfrm>
         </p:spPr>
       </p:pic>
@@ -39372,7 +39368,7 @@
             <a:pPr lvl="1"/>
             <a:r>
               <a:rPr lang="fr-FR" dirty="0" err="1" smtClean="0"/>
-              <a:t>EntityObject</a:t>
+              <a:t>ObjectGame</a:t>
             </a:r>
             <a:r>
               <a:rPr lang="fr-FR" dirty="0" smtClean="0"/>
@@ -40364,14 +40360,7 @@
                 <a:latin typeface="Courier New" pitchFamily="49" charset="0"/>
                 <a:cs typeface="Courier New" pitchFamily="49" charset="0"/>
               </a:rPr>
-              <a:t>(représente un objet soumis à la gravité</a:t>
-            </a:r>
-            <a:r>
-              <a:rPr lang="fr-FR" sz="1800" dirty="0" smtClean="0">
-                <a:latin typeface="Courier New" pitchFamily="49" charset="0"/>
-                <a:cs typeface="Courier New" pitchFamily="49" charset="0"/>
-              </a:rPr>
-              <a:t>)</a:t>
+              <a:t>(représente un objet soumis à la gravité)</a:t>
             </a:r>
           </a:p>
         </p:txBody>
@@ -45676,10 +45665,6 @@
               </a:rPr>
               <a:t>)</a:t>
             </a:r>
-            <a:endParaRPr lang="fr-FR" sz="1800" i="1" dirty="0" smtClean="0">
-              <a:latin typeface="Courier New" pitchFamily="49" charset="0"/>
-              <a:cs typeface="Courier New" pitchFamily="49" charset="0"/>
-            </a:endParaRPr>
           </a:p>
         </p:txBody>
       </p:sp>

</xml_diff>

<commit_message>
UML added for lionengine-platform, lionengine-rts and lionengine-network, doc updated.
</commit_message>
<xml_diff>
--- a/doc/src/lionengine.pptx
+++ b/doc/src/lionengine.pptx
@@ -33094,7 +33094,7 @@
           <a:p>
             <a:fld id="{7011E69A-6C3D-49BF-BD64-39027DFF6D9F}" type="datetimeFigureOut">
               <a:rPr lang="fr-FR" smtClean="0"/>
-              <a:t>06/10/2013</a:t>
+              <a:t>10/10/2013</a:t>
             </a:fld>
             <a:endParaRPr lang="fr-FR"/>
           </a:p>
@@ -33259,7 +33259,7 @@
           <a:p>
             <a:fld id="{450F901E-04C0-46F2-9379-59BF332F2F2D}" type="datetimeFigureOut">
               <a:rPr lang="fr-FR" smtClean="0"/>
-              <a:t>06/10/2013</a:t>
+              <a:t>10/10/2013</a:t>
             </a:fld>
             <a:endParaRPr lang="fr-FR" dirty="0"/>
           </a:p>
@@ -33986,7 +33986,7 @@
           <a:p>
             <a:fld id="{12F20915-7C67-4634-A5D8-123A69D3450C}" type="datetime1">
               <a:rPr lang="fr-FR" smtClean="0"/>
-              <a:t>06/10/2013</a:t>
+              <a:t>10/10/2013</a:t>
             </a:fld>
             <a:endParaRPr lang="en-US" dirty="0"/>
           </a:p>
@@ -34188,7 +34188,7 @@
           <a:p>
             <a:fld id="{2384A8FC-7B55-40A5-B33A-A5A21761988E}" type="datetime1">
               <a:rPr lang="fr-FR" smtClean="0"/>
-              <a:t>06/10/2013</a:t>
+              <a:t>10/10/2013</a:t>
             </a:fld>
             <a:endParaRPr lang="en-US"/>
           </a:p>
@@ -34377,7 +34377,7 @@
           <a:p>
             <a:fld id="{06836D45-C7BB-455F-9C10-B2EC6D70AD43}" type="datetime1">
               <a:rPr lang="fr-FR" smtClean="0"/>
-              <a:t>06/10/2013</a:t>
+              <a:t>10/10/2013</a:t>
             </a:fld>
             <a:endParaRPr lang="en-US"/>
           </a:p>
@@ -34657,7 +34657,7 @@
           <a:p>
             <a:fld id="{94ECD26F-6B54-488F-A41A-8F8D17B8D1E7}" type="datetime1">
               <a:rPr lang="fr-FR" smtClean="0"/>
-              <a:t>06/10/2013</a:t>
+              <a:t>10/10/2013</a:t>
             </a:fld>
             <a:endParaRPr lang="en-US"/>
           </a:p>
@@ -35100,7 +35100,7 @@
           <a:p>
             <a:fld id="{902E46E6-5785-4C01-A4FA-D9138E8D39F1}" type="datetime1">
               <a:rPr lang="fr-FR" smtClean="0"/>
-              <a:t>06/10/2013</a:t>
+              <a:t>10/10/2013</a:t>
             </a:fld>
             <a:endParaRPr lang="en-US"/>
           </a:p>
@@ -35353,7 +35353,7 @@
           <a:p>
             <a:fld id="{E37538CF-0A64-40DC-ACAE-A1A01767E9BB}" type="datetime1">
               <a:rPr lang="fr-FR" smtClean="0"/>
-              <a:t>06/10/2013</a:t>
+              <a:t>10/10/2013</a:t>
             </a:fld>
             <a:endParaRPr lang="en-US"/>
           </a:p>
@@ -35600,7 +35600,7 @@
           <a:p>
             <a:fld id="{E24D2700-FAB9-4EC5-833A-BAABD9C3976F}" type="datetime1">
               <a:rPr lang="fr-FR" smtClean="0"/>
-              <a:t>06/10/2013</a:t>
+              <a:t>10/10/2013</a:t>
             </a:fld>
             <a:endParaRPr lang="en-US"/>
           </a:p>
@@ -35799,7 +35799,7 @@
           <a:p>
             <a:fld id="{DECD032C-F0B6-43CF-9069-0621198CB85E}" type="datetime1">
               <a:rPr lang="fr-FR" smtClean="0"/>
-              <a:t>06/10/2013</a:t>
+              <a:t>10/10/2013</a:t>
             </a:fld>
             <a:endParaRPr lang="en-US"/>
           </a:p>
@@ -35901,7 +35901,7 @@
           <a:p>
             <a:fld id="{B2E7E3DA-57C2-4A4D-B010-BCB245593FE5}" type="datetime1">
               <a:rPr lang="fr-FR" smtClean="0"/>
-              <a:t>06/10/2013</a:t>
+              <a:t>10/10/2013</a:t>
             </a:fld>
             <a:endParaRPr lang="en-US"/>
           </a:p>
@@ -36041,7 +36041,7 @@
           <a:p>
             <a:fld id="{CBB9F109-E754-4CCC-A7B1-F4F6237E38C1}" type="datetime1">
               <a:rPr lang="fr-FR" smtClean="0"/>
-              <a:t>06/10/2013</a:t>
+              <a:t>10/10/2013</a:t>
             </a:fld>
             <a:endParaRPr lang="en-US"/>
           </a:p>
@@ -36563,7 +36563,7 @@
           <a:p>
             <a:fld id="{60D7E2F9-E6A8-4DA9-9914-BA60BD91563C}" type="datetime1">
               <a:rPr lang="fr-FR" smtClean="0"/>
-              <a:t>06/10/2013</a:t>
+              <a:t>10/10/2013</a:t>
             </a:fld>
             <a:endParaRPr lang="en-US"/>
           </a:p>
@@ -36828,7 +36828,7 @@
           <a:p>
             <a:fld id="{1F2438D6-D77E-4059-83C5-4B30AFB8DDBF}" type="datetime1">
               <a:rPr lang="fr-FR" smtClean="0"/>
-              <a:t>06/10/2013</a:t>
+              <a:t>10/10/2013</a:t>
             </a:fld>
             <a:endParaRPr lang="en-US"/>
           </a:p>
@@ -37459,7 +37459,7 @@
             <a:fld id="{F0116066-8E82-4E82-B0B5-60D788EDB8F1}" type="datetime1">
               <a:rPr lang="fr-FR" smtClean="0"/>
               <a:pPr/>
-              <a:t>06/10/2013</a:t>
+              <a:t>10/10/2013</a:t>
             </a:fld>
             <a:endParaRPr lang="en-US" dirty="0"/>
           </a:p>
@@ -41340,7 +41340,7 @@
       </p:sp>
       <p:pic>
         <p:nvPicPr>
-          <p:cNvPr id="6" name="Espace réservé du contenu 5"/>
+          <p:cNvPr id="9" name="Espace réservé du contenu 8"/>
           <p:cNvPicPr>
             <a:picLocks noGrp="1" noChangeAspect="1"/>
           </p:cNvPicPr>
@@ -41362,8 +41362,8 @@
         </p:blipFill>
         <p:spPr>
           <a:xfrm>
-            <a:off x="1032956" y="1600200"/>
-            <a:ext cx="7313037" cy="4495800"/>
+            <a:off x="1490138" y="1600200"/>
+            <a:ext cx="6398673" cy="4495800"/>
           </a:xfrm>
         </p:spPr>
       </p:pic>
@@ -43932,7 +43932,7 @@
       </p:sp>
       <p:pic>
         <p:nvPicPr>
-          <p:cNvPr id="7" name="Espace réservé du contenu 6"/>
+          <p:cNvPr id="6" name="Espace réservé du contenu 5"/>
           <p:cNvPicPr>
             <a:picLocks noGrp="1" noChangeAspect="1"/>
           </p:cNvPicPr>
@@ -43954,8 +43954,8 @@
         </p:blipFill>
         <p:spPr>
           <a:xfrm>
-            <a:off x="962457" y="1600200"/>
-            <a:ext cx="7454036" cy="4495800"/>
+            <a:off x="899592" y="1530547"/>
+            <a:ext cx="7560839" cy="4806165"/>
           </a:xfrm>
         </p:spPr>
       </p:pic>

</xml_diff>